<commit_message>
Figur, nytt tips og diverse småjusteringer
</commit_message>
<xml_diff>
--- a/Støttemateriell/python jukselapp for matte.pptx
+++ b/Støttemateriell/python jukselapp for matte.pptx
@@ -379,7 +379,7 @@
           <a:p>
             <a:fld id="{3856D7FA-FD33-3C4B-8838-4FF72756CB17}" type="datetimeFigureOut">
               <a:rPr lang="nb-NO" smtClean="0"/>
-              <a:t>28.10.2020</a:t>
+              <a:t>29.10.2020</a:t>
             </a:fld>
             <a:endParaRPr lang="nb-NO"/>
           </a:p>
@@ -861,7 +861,7 @@
           <a:p>
             <a:fld id="{A339A917-CD80-4B45-A18B-71FF20012543}" type="datetimeFigureOut">
               <a:rPr lang="nb-NO" smtClean="0"/>
-              <a:t>28.10.2020</a:t>
+              <a:t>29.10.2020</a:t>
             </a:fld>
             <a:endParaRPr lang="nb-NO"/>
           </a:p>
@@ -1031,7 +1031,7 @@
           <a:p>
             <a:fld id="{A339A917-CD80-4B45-A18B-71FF20012543}" type="datetimeFigureOut">
               <a:rPr lang="nb-NO" smtClean="0"/>
-              <a:t>28.10.2020</a:t>
+              <a:t>29.10.2020</a:t>
             </a:fld>
             <a:endParaRPr lang="nb-NO"/>
           </a:p>
@@ -1211,7 +1211,7 @@
           <a:p>
             <a:fld id="{A339A917-CD80-4B45-A18B-71FF20012543}" type="datetimeFigureOut">
               <a:rPr lang="nb-NO" smtClean="0"/>
-              <a:t>28.10.2020</a:t>
+              <a:t>29.10.2020</a:t>
             </a:fld>
             <a:endParaRPr lang="nb-NO"/>
           </a:p>
@@ -1381,7 +1381,7 @@
           <a:p>
             <a:fld id="{A339A917-CD80-4B45-A18B-71FF20012543}" type="datetimeFigureOut">
               <a:rPr lang="nb-NO" smtClean="0"/>
-              <a:t>28.10.2020</a:t>
+              <a:t>29.10.2020</a:t>
             </a:fld>
             <a:endParaRPr lang="nb-NO"/>
           </a:p>
@@ -1625,7 +1625,7 @@
           <a:p>
             <a:fld id="{A339A917-CD80-4B45-A18B-71FF20012543}" type="datetimeFigureOut">
               <a:rPr lang="nb-NO" smtClean="0"/>
-              <a:t>28.10.2020</a:t>
+              <a:t>29.10.2020</a:t>
             </a:fld>
             <a:endParaRPr lang="nb-NO"/>
           </a:p>
@@ -1857,7 +1857,7 @@
           <a:p>
             <a:fld id="{A339A917-CD80-4B45-A18B-71FF20012543}" type="datetimeFigureOut">
               <a:rPr lang="nb-NO" smtClean="0"/>
-              <a:t>28.10.2020</a:t>
+              <a:t>29.10.2020</a:t>
             </a:fld>
             <a:endParaRPr lang="nb-NO"/>
           </a:p>
@@ -2224,7 +2224,7 @@
           <a:p>
             <a:fld id="{A339A917-CD80-4B45-A18B-71FF20012543}" type="datetimeFigureOut">
               <a:rPr lang="nb-NO" smtClean="0"/>
-              <a:t>28.10.2020</a:t>
+              <a:t>29.10.2020</a:t>
             </a:fld>
             <a:endParaRPr lang="nb-NO"/>
           </a:p>
@@ -2342,7 +2342,7 @@
           <a:p>
             <a:fld id="{A339A917-CD80-4B45-A18B-71FF20012543}" type="datetimeFigureOut">
               <a:rPr lang="nb-NO" smtClean="0"/>
-              <a:t>28.10.2020</a:t>
+              <a:t>29.10.2020</a:t>
             </a:fld>
             <a:endParaRPr lang="nb-NO"/>
           </a:p>
@@ -2437,7 +2437,7 @@
           <a:p>
             <a:fld id="{A339A917-CD80-4B45-A18B-71FF20012543}" type="datetimeFigureOut">
               <a:rPr lang="nb-NO" smtClean="0"/>
-              <a:t>28.10.2020</a:t>
+              <a:t>29.10.2020</a:t>
             </a:fld>
             <a:endParaRPr lang="nb-NO"/>
           </a:p>
@@ -2714,7 +2714,7 @@
           <a:p>
             <a:fld id="{A339A917-CD80-4B45-A18B-71FF20012543}" type="datetimeFigureOut">
               <a:rPr lang="nb-NO" smtClean="0"/>
-              <a:t>28.10.2020</a:t>
+              <a:t>29.10.2020</a:t>
             </a:fld>
             <a:endParaRPr lang="nb-NO"/>
           </a:p>
@@ -2971,7 +2971,7 @@
           <a:p>
             <a:fld id="{A339A917-CD80-4B45-A18B-71FF20012543}" type="datetimeFigureOut">
               <a:rPr lang="nb-NO" smtClean="0"/>
-              <a:t>28.10.2020</a:t>
+              <a:t>29.10.2020</a:t>
             </a:fld>
             <a:endParaRPr lang="nb-NO"/>
           </a:p>
@@ -3184,7 +3184,7 @@
           <a:p>
             <a:fld id="{A339A917-CD80-4B45-A18B-71FF20012543}" type="datetimeFigureOut">
               <a:rPr lang="nb-NO" smtClean="0"/>
-              <a:t>28.10.2020</a:t>
+              <a:t>29.10.2020</a:t>
             </a:fld>
             <a:endParaRPr lang="nb-NO"/>
           </a:p>
@@ -3712,7 +3712,7 @@
                 <a:latin typeface="Leelawadee" panose="020B0502040204020203" pitchFamily="34" charset="-34"/>
                 <a:cs typeface="Leelawadee" panose="020B0502040204020203" pitchFamily="34" charset="-34"/>
               </a:rPr>
-              <a:t>2020-10-28</a:t>
+              <a:t>2020-10-29</a:t>
             </a:r>
           </a:p>
           <a:p>
@@ -3771,7 +3771,7 @@
           <p:nvPr>
             <p:extLst>
               <p:ext uri="{D42A27DB-BD31-4B8C-83A1-F6EECF244321}">
-                <p14:modId xmlns:p14="http://schemas.microsoft.com/office/powerpoint/2010/main" val="577673822"/>
+                <p14:modId xmlns:p14="http://schemas.microsoft.com/office/powerpoint/2010/main" val="1999381317"/>
               </p:ext>
             </p:extLst>
           </p:nvPr>
@@ -3956,16 +3956,16 @@
                           <a:latin typeface="Source Code Pro" panose="020B0509030403020204" pitchFamily="49" charset="0"/>
                           <a:ea typeface="Source Code Pro" panose="020B0509030403020204" pitchFamily="49" charset="0"/>
                         </a:rPr>
-                        <a:t>e = "Hei»</a:t>
-                      </a:r>
-                    </a:p>
-                    <a:p>
-                      <a:r>
-                        <a:rPr lang="nb-NO" sz="1000" dirty="0">
-                          <a:latin typeface="Source Code Pro" panose="020B0509030403020204" pitchFamily="49" charset="0"/>
-                          <a:ea typeface="Source Code Pro" panose="020B0509030403020204" pitchFamily="49" charset="0"/>
-                        </a:rPr>
-                        <a:t>f = ‘hopp’</a:t>
+                        <a:t>e = "Hei"</a:t>
+                      </a:r>
+                    </a:p>
+                    <a:p>
+                      <a:r>
+                        <a:rPr lang="nb-NO" sz="1000" dirty="0">
+                          <a:latin typeface="Source Code Pro" panose="020B0509030403020204" pitchFamily="49" charset="0"/>
+                          <a:ea typeface="Source Code Pro" panose="020B0509030403020204" pitchFamily="49" charset="0"/>
+                        </a:rPr>
+                        <a:t>f = 'hopp'</a:t>
                       </a:r>
                     </a:p>
                   </a:txBody>
@@ -7647,7 +7647,7 @@
                 </a:solidFill>
                 <a:latin typeface=" Source Code Pro" panose="020B0509030403020204" pitchFamily="49" charset="0"/>
               </a:rPr>
-              <a:t>x</a:t>
+              <a:t>tall</a:t>
             </a:r>
             <a:r>
               <a:rPr lang="nb-NO" sz="1000" dirty="0">
@@ -7694,7 +7694,7 @@
                 </a:solidFill>
                 <a:latin typeface=" Source Code Pro" panose="020B0509030403020204" pitchFamily="49" charset="0"/>
               </a:rPr>
-              <a:t>x</a:t>
+              <a:t>tall</a:t>
             </a:r>
             <a:r>
               <a:rPr lang="nb-NO" sz="1000" dirty="0">
@@ -7859,7 +7859,7 @@
           <p:nvPr>
             <p:extLst>
               <p:ext uri="{D42A27DB-BD31-4B8C-83A1-F6EECF244321}">
-                <p14:modId xmlns:p14="http://schemas.microsoft.com/office/powerpoint/2010/main" val="477969729"/>
+                <p14:modId xmlns:p14="http://schemas.microsoft.com/office/powerpoint/2010/main" val="784264164"/>
               </p:ext>
             </p:extLst>
           </p:nvPr>
@@ -8325,7 +8325,7 @@
                           <a:latin typeface="Source Code Pro" panose="020B0509030403020204" pitchFamily="49" charset="0"/>
                           <a:ea typeface="Source Code Pro" panose="020B0509030403020204" pitchFamily="49" charset="0"/>
                         </a:rPr>
-                        <a:t>saldo = 10000</a:t>
+                        <a:t>saldo = 10000 # Innskuddet</a:t>
                       </a:r>
                     </a:p>
                     <a:p>
@@ -8341,7 +8341,7 @@
                           <a:latin typeface="Source Code Pro" panose="020B0509030403020204" pitchFamily="49" charset="0"/>
                           <a:ea typeface="Source Code Pro" panose="020B0509030403020204" pitchFamily="49" charset="0"/>
                         </a:rPr>
-                        <a:t> = 1.02</a:t>
+                        <a:t> = 1.02     # Vekstfaktor 2%</a:t>
                       </a:r>
                     </a:p>
                     <a:p>
@@ -8357,7 +8357,7 @@
                           <a:latin typeface="Source Code Pro" panose="020B0509030403020204" pitchFamily="49" charset="0"/>
                           <a:ea typeface="Source Code Pro" panose="020B0509030403020204" pitchFamily="49" charset="0"/>
                         </a:rPr>
-                        <a:t> = 1</a:t>
+                        <a:t> = 1       # Startverdi år</a:t>
                       </a:r>
                       <a:br>
                         <a:rPr lang="nb-NO" sz="1000" dirty="0">
@@ -8448,7 +8448,7 @@
                           <a:latin typeface="Source Code Pro" panose="020B0509030403020204" pitchFamily="49" charset="0"/>
                           <a:ea typeface="Source Code Pro" panose="020B0509030403020204" pitchFamily="49" charset="0"/>
                         </a:rPr>
-                        <a:t> + 1</a:t>
+                        <a:t> + 1 # Nytt år</a:t>
                       </a:r>
                       <a:br>
                         <a:rPr lang="nb-NO" sz="1000" dirty="0">
@@ -8563,14 +8563,14 @@
           <p:nvPr>
             <p:extLst>
               <p:ext uri="{D42A27DB-BD31-4B8C-83A1-F6EECF244321}">
-                <p14:modId xmlns:p14="http://schemas.microsoft.com/office/powerpoint/2010/main" val="2046142179"/>
+                <p14:modId xmlns:p14="http://schemas.microsoft.com/office/powerpoint/2010/main" val="3369040376"/>
               </p:ext>
             </p:extLst>
           </p:nvPr>
         </p:nvGraphicFramePr>
         <p:xfrm>
           <a:off x="4417764" y="3525520"/>
-          <a:ext cx="2440236" cy="3997960"/>
+          <a:ext cx="2440236" cy="3921760"/>
         </p:xfrm>
         <a:graphic>
           <a:graphicData uri="http://schemas.openxmlformats.org/drawingml/2006/table">
@@ -8641,27 +8641,30 @@
                         <a:t># tips 1</a:t>
                       </a:r>
                     </a:p>
-                  </a:txBody>
-                  <a:tcPr/>
-                </a:tc>
-                <a:tc>
-                  <a:txBody>
-                    <a:bodyPr/>
-                    <a:lstStyle/>
-                    <a:p>
-                      <a:r>
-                        <a:rPr lang="nb-NO" sz="1100" dirty="0">
-                          <a:latin typeface="Leelawadee" panose="020B0502040204020203" pitchFamily="34" charset="-34"/>
-                          <a:cs typeface="Leelawadee" panose="020B0502040204020203" pitchFamily="34" charset="-34"/>
-                        </a:rPr>
-                        <a:t>Alt som står etter en # blir ignorert av Python, og kan brukes for å skrive kommentarer i koden.</a:t>
-                      </a:r>
-                    </a:p>
-                    <a:p>
-                      <a:endParaRPr lang="nb-NO" sz="1100" dirty="0">
-                        <a:latin typeface="Leelawadee" panose="020B0502040204020203" pitchFamily="34" charset="-34"/>
-                        <a:cs typeface="Leelawadee" panose="020B0502040204020203" pitchFamily="34" charset="-34"/>
-                      </a:endParaRPr>
+                    <a:p>
+                      <a:r>
+                        <a:rPr lang="nb-NO" sz="1000" dirty="0">
+                          <a:latin typeface="Source Code Pro" panose="020B0509030403020204" pitchFamily="49" charset="0"/>
+                          <a:ea typeface="Source Code Pro" panose="020B0509030403020204" pitchFamily="49" charset="0"/>
+                        </a:rPr>
+                        <a:t># kommentar!</a:t>
+                      </a:r>
+                    </a:p>
+                  </a:txBody>
+                  <a:tcPr/>
+                </a:tc>
+                <a:tc>
+                  <a:txBody>
+                    <a:bodyPr/>
+                    <a:lstStyle/>
+                    <a:p>
+                      <a:r>
+                        <a:rPr lang="nb-NO" sz="1100" dirty="0">
+                          <a:latin typeface="Leelawadee" panose="020B0502040204020203" pitchFamily="34" charset="-34"/>
+                          <a:cs typeface="Leelawadee" panose="020B0502040204020203" pitchFamily="34" charset="-34"/>
+                        </a:rPr>
+                        <a:t>Alt som står etter en # blir ignorert av Python, brukes for å skrive kommentarer.</a:t>
+                      </a:r>
                     </a:p>
                   </a:txBody>
                   <a:tcPr/>
@@ -8801,9 +8804,48 @@
                           <a:latin typeface="Leelawadee" panose="020B0502040204020203" pitchFamily="34" charset="-34"/>
                           <a:cs typeface="Leelawadee" panose="020B0502040204020203" pitchFamily="34" charset="-34"/>
                         </a:rPr>
-                        <a:t>Punktum er desimalskille, og komma brukes for å skille mellom tall eller variabler</a:t>
-                      </a:r>
-                    </a:p>
+                        <a:t>Punktum er desimalskille, og komma skiller mellom tall eller variabler.</a:t>
+                      </a:r>
+                    </a:p>
+                  </a:txBody>
+                  <a:tcPr/>
+                </a:tc>
+                <a:extLst>
+                  <a:ext uri="{0D108BD9-81ED-4DB2-BD59-A6C34878D82A}">
+                    <a16:rowId xmlns:a16="http://schemas.microsoft.com/office/drawing/2014/main" val="1965635201"/>
+                  </a:ext>
+                </a:extLst>
+              </a:tr>
+              <a:tr h="370840">
+                <a:tc>
+                  <a:txBody>
+                    <a:bodyPr/>
+                    <a:lstStyle/>
+                    <a:p>
+                      <a:r>
+                        <a:rPr lang="nb-NO" sz="1000" dirty="0">
+                          <a:latin typeface="Source Code Pro" panose="020B0509030403020204" pitchFamily="49" charset="0"/>
+                          <a:ea typeface="Source Code Pro" panose="020B0509030403020204" pitchFamily="49" charset="0"/>
+                        </a:rPr>
+                        <a:t>x = x + 1</a:t>
+                      </a:r>
+                    </a:p>
+                    <a:p>
+                      <a:r>
+                        <a:rPr lang="nb-NO" sz="1000" dirty="0">
+                          <a:latin typeface="Source Code Pro" panose="020B0509030403020204" pitchFamily="49" charset="0"/>
+                          <a:ea typeface="Source Code Pro" panose="020B0509030403020204" pitchFamily="49" charset="0"/>
+                        </a:rPr>
+                        <a:t>x += 1</a:t>
+                      </a:r>
+                    </a:p>
+                  </a:txBody>
+                  <a:tcPr/>
+                </a:tc>
+                <a:tc>
+                  <a:txBody>
+                    <a:bodyPr/>
+                    <a:lstStyle/>
                     <a:p>
                       <a:pPr marL="0" marR="0" lvl="0" indent="0" algn="l" defTabSz="685800" rtl="0" eaLnBrk="1" fontAlgn="auto" latinLnBrk="0" hangingPunct="1">
                         <a:lnSpc>
@@ -8822,17 +8864,20 @@
                         <a:tabLst/>
                         <a:defRPr/>
                       </a:pPr>
-                      <a:endParaRPr lang="nb-NO" sz="1100" dirty="0">
-                        <a:latin typeface="Leelawadee" panose="020B0502040204020203" pitchFamily="34" charset="-34"/>
-                        <a:cs typeface="Leelawadee" panose="020B0502040204020203" pitchFamily="34" charset="-34"/>
-                      </a:endParaRPr>
+                      <a:r>
+                        <a:rPr lang="nb-NO" sz="1100" dirty="0">
+                          <a:latin typeface="Leelawadee" panose="020B0502040204020203" pitchFamily="34" charset="-34"/>
+                          <a:cs typeface="Leelawadee" panose="020B0502040204020203" pitchFamily="34" charset="-34"/>
+                        </a:rPr>
+                        <a:t>Disse to linjene gjør det samme. Den siste er litt raskere å skrive.</a:t>
+                      </a:r>
                     </a:p>
                   </a:txBody>
                   <a:tcPr/>
                 </a:tc>
                 <a:extLst>
                   <a:ext uri="{0D108BD9-81ED-4DB2-BD59-A6C34878D82A}">
-                    <a16:rowId xmlns:a16="http://schemas.microsoft.com/office/drawing/2014/main" val="1965635201"/>
+                    <a16:rowId xmlns:a16="http://schemas.microsoft.com/office/drawing/2014/main" val="2735780979"/>
                   </a:ext>
                 </a:extLst>
               </a:tr>
@@ -8854,7 +8899,7 @@
         </p:nvSpPr>
         <p:spPr>
           <a:xfrm>
-            <a:off x="1772683" y="7523480"/>
+            <a:off x="2039383" y="7523480"/>
             <a:ext cx="3312633" cy="1631216"/>
           </a:xfrm>
           <a:prstGeom prst="rect">
@@ -9412,6 +9457,227 @@
                 <a:latin typeface=" Source Code Pro" panose="020B0509030403020204" pitchFamily="49" charset="0"/>
               </a:rPr>
               <a:t>))</a:t>
+            </a:r>
+          </a:p>
+        </p:txBody>
+      </p:sp>
+      <p:sp>
+        <p:nvSpPr>
+          <p:cNvPr id="2" name="Ellipse 1">
+            <a:extLst>
+              <a:ext uri="{FF2B5EF4-FFF2-40B4-BE49-F238E27FC236}">
+                <a16:creationId xmlns:a16="http://schemas.microsoft.com/office/drawing/2014/main" id="{339D2789-F7D1-F941-A480-5C92AEF0BBE1}"/>
+              </a:ext>
+            </a:extLst>
+          </p:cNvPr>
+          <p:cNvSpPr/>
+          <p:nvPr/>
+        </p:nvSpPr>
+        <p:spPr>
+          <a:xfrm>
+            <a:off x="228601" y="7771821"/>
+            <a:ext cx="1134533" cy="1134534"/>
+          </a:xfrm>
+          <a:prstGeom prst="ellipse">
+            <a:avLst/>
+          </a:prstGeom>
+          <a:solidFill>
+            <a:schemeClr val="accent5">
+              <a:lumMod val="20000"/>
+              <a:lumOff val="80000"/>
+            </a:schemeClr>
+          </a:solidFill>
+        </p:spPr>
+        <p:style>
+          <a:lnRef idx="2">
+            <a:schemeClr val="accent1">
+              <a:shade val="50000"/>
+            </a:schemeClr>
+          </a:lnRef>
+          <a:fillRef idx="1">
+            <a:schemeClr val="accent1"/>
+          </a:fillRef>
+          <a:effectRef idx="0">
+            <a:schemeClr val="accent1"/>
+          </a:effectRef>
+          <a:fontRef idx="minor">
+            <a:schemeClr val="lt1"/>
+          </a:fontRef>
+        </p:style>
+        <p:txBody>
+          <a:bodyPr rtlCol="0" anchor="ctr"/>
+          <a:lstStyle/>
+          <a:p>
+            <a:pPr algn="ctr"/>
+            <a:endParaRPr lang="nb-NO"/>
+          </a:p>
+        </p:txBody>
+      </p:sp>
+      <p:sp>
+        <p:nvSpPr>
+          <p:cNvPr id="3" name="TekstSylinder 2">
+            <a:extLst>
+              <a:ext uri="{FF2B5EF4-FFF2-40B4-BE49-F238E27FC236}">
+                <a16:creationId xmlns:a16="http://schemas.microsoft.com/office/drawing/2014/main" id="{152EBC6D-733A-EB4D-9670-6DD7E80BECB2}"/>
+              </a:ext>
+            </a:extLst>
+          </p:cNvPr>
+          <p:cNvSpPr txBox="1"/>
+          <p:nvPr/>
+        </p:nvSpPr>
+        <p:spPr>
+          <a:xfrm rot="16200000">
+            <a:off x="910215" y="8164445"/>
+            <a:ext cx="1620187" cy="307777"/>
+          </a:xfrm>
+          <a:prstGeom prst="rect">
+            <a:avLst/>
+          </a:prstGeom>
+          <a:noFill/>
+        </p:spPr>
+        <p:txBody>
+          <a:bodyPr wrap="none" rtlCol="0">
+            <a:spAutoFit/>
+          </a:bodyPr>
+          <a:lstStyle/>
+          <a:p>
+            <a:r>
+              <a:rPr lang="nb-NO" sz="1400" u="sng" dirty="0">
+                <a:solidFill>
+                  <a:schemeClr val="bg1">
+                    <a:lumMod val="50000"/>
+                  </a:schemeClr>
+                </a:solidFill>
+                <a:latin typeface="Leelawadee" panose="020B0502040204020203" pitchFamily="34" charset="-34"/>
+                <a:cs typeface="Leelawadee" panose="020B0502040204020203" pitchFamily="34" charset="-34"/>
+              </a:rPr>
+              <a:t>Programeksempel</a:t>
+            </a:r>
+          </a:p>
+        </p:txBody>
+      </p:sp>
+      <p:cxnSp>
+        <p:nvCxnSpPr>
+          <p:cNvPr id="8" name="Rett pil 7">
+            <a:extLst>
+              <a:ext uri="{FF2B5EF4-FFF2-40B4-BE49-F238E27FC236}">
+                <a16:creationId xmlns:a16="http://schemas.microsoft.com/office/drawing/2014/main" id="{62D80F14-24E5-134B-A072-102307DE1B55}"/>
+              </a:ext>
+            </a:extLst>
+          </p:cNvPr>
+          <p:cNvCxnSpPr>
+            <a:endCxn id="2" idx="6"/>
+          </p:cNvCxnSpPr>
+          <p:nvPr/>
+        </p:nvCxnSpPr>
+        <p:spPr>
+          <a:xfrm>
+            <a:off x="795867" y="8339088"/>
+            <a:ext cx="567267" cy="0"/>
+          </a:xfrm>
+          <a:prstGeom prst="straightConnector1">
+            <a:avLst/>
+          </a:prstGeom>
+          <a:ln w="25400">
+            <a:headEnd type="triangle"/>
+            <a:tailEnd type="triangle"/>
+          </a:ln>
+        </p:spPr>
+        <p:style>
+          <a:lnRef idx="1">
+            <a:schemeClr val="accent1"/>
+          </a:lnRef>
+          <a:fillRef idx="0">
+            <a:schemeClr val="accent1"/>
+          </a:fillRef>
+          <a:effectRef idx="0">
+            <a:schemeClr val="accent1"/>
+          </a:effectRef>
+          <a:fontRef idx="minor">
+            <a:schemeClr val="tx1"/>
+          </a:fontRef>
+        </p:style>
+      </p:cxnSp>
+      <p:sp>
+        <p:nvSpPr>
+          <p:cNvPr id="11" name="TekstSylinder 10">
+            <a:extLst>
+              <a:ext uri="{FF2B5EF4-FFF2-40B4-BE49-F238E27FC236}">
+                <a16:creationId xmlns:a16="http://schemas.microsoft.com/office/drawing/2014/main" id="{25548114-E02C-664D-8A1B-04572FD54519}"/>
+              </a:ext>
+            </a:extLst>
+          </p:cNvPr>
+          <p:cNvSpPr txBox="1"/>
+          <p:nvPr/>
+        </p:nvSpPr>
+        <p:spPr>
+          <a:xfrm>
+            <a:off x="963799" y="8051334"/>
+            <a:ext cx="256802" cy="338554"/>
+          </a:xfrm>
+          <a:prstGeom prst="rect">
+            <a:avLst/>
+          </a:prstGeom>
+          <a:noFill/>
+        </p:spPr>
+        <p:txBody>
+          <a:bodyPr wrap="none" rtlCol="0">
+            <a:spAutoFit/>
+          </a:bodyPr>
+          <a:lstStyle/>
+          <a:p>
+            <a:r>
+              <a:rPr lang="nb-NO" sz="1600" dirty="0">
+                <a:solidFill>
+                  <a:schemeClr val="accent1"/>
+                </a:solidFill>
+                <a:latin typeface="Leelawadee" panose="020B0502040204020203" pitchFamily="34" charset="-34"/>
+                <a:cs typeface="Leelawadee" panose="020B0502040204020203" pitchFamily="34" charset="-34"/>
+              </a:rPr>
+              <a:t>r</a:t>
+            </a:r>
+          </a:p>
+        </p:txBody>
+      </p:sp>
+      <p:sp>
+        <p:nvSpPr>
+          <p:cNvPr id="13" name="TekstSylinder 12">
+            <a:extLst>
+              <a:ext uri="{FF2B5EF4-FFF2-40B4-BE49-F238E27FC236}">
+                <a16:creationId xmlns:a16="http://schemas.microsoft.com/office/drawing/2014/main" id="{3FC065B0-5D5B-3948-BA3D-E1902EF83734}"/>
+              </a:ext>
+            </a:extLst>
+          </p:cNvPr>
+          <p:cNvSpPr txBox="1"/>
+          <p:nvPr/>
+        </p:nvSpPr>
+        <p:spPr>
+          <a:xfrm rot="16200000">
+            <a:off x="2384076" y="395124"/>
+            <a:ext cx="1107996" cy="230832"/>
+          </a:xfrm>
+          <a:prstGeom prst="rect">
+            <a:avLst/>
+          </a:prstGeom>
+          <a:noFill/>
+        </p:spPr>
+        <p:txBody>
+          <a:bodyPr wrap="none" rtlCol="0">
+            <a:spAutoFit/>
+          </a:bodyPr>
+          <a:lstStyle/>
+          <a:p>
+            <a:r>
+              <a:rPr lang="nb-NO" sz="900" u="sng" dirty="0">
+                <a:solidFill>
+                  <a:schemeClr val="bg1">
+                    <a:lumMod val="50000"/>
+                  </a:schemeClr>
+                </a:solidFill>
+                <a:latin typeface="Leelawadee" panose="020B0502040204020203" pitchFamily="34" charset="-34"/>
+                <a:cs typeface="Leelawadee" panose="020B0502040204020203" pitchFamily="34" charset="-34"/>
+              </a:rPr>
+              <a:t>Programeksempel</a:t>
             </a:r>
           </a:p>
         </p:txBody>

</xml_diff>

<commit_message>
Bytter rekkefølge på matte-operatorer
</commit_message>
<xml_diff>
--- a/Støttemateriell/python jukselapp for matte.pptx
+++ b/Støttemateriell/python jukselapp for matte.pptx
@@ -4341,7 +4341,7 @@
           <p:nvPr>
             <p:extLst>
               <p:ext uri="{D42A27DB-BD31-4B8C-83A1-F6EECF244321}">
-                <p14:modId xmlns:p14="http://schemas.microsoft.com/office/powerpoint/2010/main" val="3937256078"/>
+                <p14:modId xmlns:p14="http://schemas.microsoft.com/office/powerpoint/2010/main" val="3756421715"/>
               </p:ext>
             </p:extLst>
           </p:nvPr>
@@ -4530,23 +4530,23 @@
                           <a:latin typeface="Source Code Pro" panose="020B0509030403020204" pitchFamily="49" charset="0"/>
                           <a:ea typeface="Source Code Pro" panose="020B0509030403020204" pitchFamily="49" charset="0"/>
                         </a:rPr>
-                        <a:t>/</a:t>
-                      </a:r>
-                    </a:p>
-                  </a:txBody>
-                  <a:tcPr/>
-                </a:tc>
-                <a:tc>
-                  <a:txBody>
-                    <a:bodyPr/>
-                    <a:lstStyle/>
-                    <a:p>
-                      <a:r>
-                        <a:rPr lang="nb-NO" sz="1100" dirty="0">
-                          <a:latin typeface="Leelawadee" panose="020B0502040204020203" pitchFamily="34" charset="-34"/>
-                          <a:cs typeface="Leelawadee" panose="020B0502040204020203" pitchFamily="34" charset="-34"/>
-                        </a:rPr>
-                        <a:t>Divisjon</a:t>
+                        <a:t>*</a:t>
+                      </a:r>
+                    </a:p>
+                  </a:txBody>
+                  <a:tcPr/>
+                </a:tc>
+                <a:tc>
+                  <a:txBody>
+                    <a:bodyPr/>
+                    <a:lstStyle/>
+                    <a:p>
+                      <a:r>
+                        <a:rPr lang="nb-NO" sz="1100" dirty="0">
+                          <a:latin typeface="Leelawadee" panose="020B0502040204020203" pitchFamily="34" charset="-34"/>
+                          <a:cs typeface="Leelawadee" panose="020B0502040204020203" pitchFamily="34" charset="-34"/>
+                        </a:rPr>
+                        <a:t>Multiplikasjon</a:t>
                       </a:r>
                     </a:p>
                     <a:p>
@@ -4564,14 +4564,8 @@
                           <a:latin typeface="Leelawadee" panose="020B0502040204020203" pitchFamily="34" charset="-34"/>
                           <a:cs typeface="Leelawadee" panose="020B0502040204020203" pitchFamily="34" charset="-34"/>
                         </a:rPr>
-                        <a:t>9 / 4 = 2.25</a:t>
-                      </a:r>
-                    </a:p>
-                    <a:p>
-                      <a:endParaRPr lang="nb-NO" sz="1100" dirty="0">
-                        <a:latin typeface="Leelawadee" panose="020B0502040204020203" pitchFamily="34" charset="-34"/>
-                        <a:cs typeface="Leelawadee" panose="020B0502040204020203" pitchFamily="34" charset="-34"/>
-                      </a:endParaRPr>
+                        <a:t>9 * 4 = 36</a:t>
+                      </a:r>
                     </a:p>
                   </a:txBody>
                   <a:tcPr/>
@@ -4593,23 +4587,23 @@
                           <a:latin typeface="Source Code Pro" panose="020B0509030403020204" pitchFamily="49" charset="0"/>
                           <a:ea typeface="Source Code Pro" panose="020B0509030403020204" pitchFamily="49" charset="0"/>
                         </a:rPr>
-                        <a:t>*</a:t>
-                      </a:r>
-                    </a:p>
-                  </a:txBody>
-                  <a:tcPr/>
-                </a:tc>
-                <a:tc>
-                  <a:txBody>
-                    <a:bodyPr/>
-                    <a:lstStyle/>
-                    <a:p>
-                      <a:r>
-                        <a:rPr lang="nb-NO" sz="1100" dirty="0">
-                          <a:latin typeface="Leelawadee" panose="020B0502040204020203" pitchFamily="34" charset="-34"/>
-                          <a:cs typeface="Leelawadee" panose="020B0502040204020203" pitchFamily="34" charset="-34"/>
-                        </a:rPr>
-                        <a:t>Multiplikasjon</a:t>
+                        <a:t>/</a:t>
+                      </a:r>
+                    </a:p>
+                  </a:txBody>
+                  <a:tcPr/>
+                </a:tc>
+                <a:tc>
+                  <a:txBody>
+                    <a:bodyPr/>
+                    <a:lstStyle/>
+                    <a:p>
+                      <a:r>
+                        <a:rPr lang="nb-NO" sz="1100" dirty="0">
+                          <a:latin typeface="Leelawadee" panose="020B0502040204020203" pitchFamily="34" charset="-34"/>
+                          <a:cs typeface="Leelawadee" panose="020B0502040204020203" pitchFamily="34" charset="-34"/>
+                        </a:rPr>
+                        <a:t>Divisjon</a:t>
                       </a:r>
                     </a:p>
                     <a:p>
@@ -4627,7 +4621,7 @@
                           <a:latin typeface="Leelawadee" panose="020B0502040204020203" pitchFamily="34" charset="-34"/>
                           <a:cs typeface="Leelawadee" panose="020B0502040204020203" pitchFamily="34" charset="-34"/>
                         </a:rPr>
-                        <a:t>9 * 4 = 36</a:t>
+                        <a:t>9 / 4 = 2.25</a:t>
                       </a:r>
                     </a:p>
                   </a:txBody>
@@ -4650,41 +4644,41 @@
                           <a:latin typeface="Source Code Pro" panose="020B0509030403020204" pitchFamily="49" charset="0"/>
                           <a:ea typeface="Source Code Pro" panose="020B0509030403020204" pitchFamily="49" charset="0"/>
                         </a:rPr>
-                        <a:t>**</a:t>
-                      </a:r>
-                    </a:p>
-                  </a:txBody>
-                  <a:tcPr/>
-                </a:tc>
-                <a:tc>
-                  <a:txBody>
-                    <a:bodyPr/>
-                    <a:lstStyle/>
-                    <a:p>
-                      <a:r>
-                        <a:rPr lang="nb-NO" sz="1100" dirty="0">
-                          <a:latin typeface="Leelawadee" panose="020B0502040204020203" pitchFamily="34" charset="-34"/>
-                          <a:cs typeface="Leelawadee" panose="020B0502040204020203" pitchFamily="34" charset="-34"/>
-                        </a:rPr>
-                        <a:t>Eksponent</a:t>
-                      </a:r>
-                    </a:p>
-                    <a:p>
-                      <a:r>
-                        <a:rPr lang="nb-NO" sz="1100" dirty="0">
-                          <a:latin typeface="Leelawadee" panose="020B0502040204020203" pitchFamily="34" charset="-34"/>
-                          <a:cs typeface="Leelawadee" panose="020B0502040204020203" pitchFamily="34" charset="-34"/>
-                        </a:rPr>
-                        <a:t>Eksempel</a:t>
-                      </a:r>
-                    </a:p>
-                    <a:p>
-                      <a:r>
-                        <a:rPr lang="nb-NO" sz="1100" dirty="0">
-                          <a:latin typeface="Leelawadee" panose="020B0502040204020203" pitchFamily="34" charset="-34"/>
-                          <a:cs typeface="Leelawadee" panose="020B0502040204020203" pitchFamily="34" charset="-34"/>
-                        </a:rPr>
-                        <a:t>9 ** 4 = 6561</a:t>
+                        <a:t>//</a:t>
+                      </a:r>
+                    </a:p>
+                  </a:txBody>
+                  <a:tcPr/>
+                </a:tc>
+                <a:tc>
+                  <a:txBody>
+                    <a:bodyPr/>
+                    <a:lstStyle/>
+                    <a:p>
+                      <a:r>
+                        <a:rPr lang="nb-NO" sz="1100" dirty="0">
+                          <a:latin typeface="Leelawadee" panose="020B0502040204020203" pitchFamily="34" charset="-34"/>
+                          <a:cs typeface="Leelawadee" panose="020B0502040204020203" pitchFamily="34" charset="-34"/>
+                        </a:rPr>
+                        <a:t>Heltalldivisjon</a:t>
+                      </a:r>
+                    </a:p>
+                    <a:p>
+                      <a:r>
+                        <a:rPr lang="nb-NO" sz="1100" dirty="0">
+                          <a:latin typeface="Leelawadee" panose="020B0502040204020203" pitchFamily="34" charset="-34"/>
+                          <a:cs typeface="Leelawadee" panose="020B0502040204020203" pitchFamily="34" charset="-34"/>
+                        </a:rPr>
+                        <a:t>Eksempel:</a:t>
+                      </a:r>
+                    </a:p>
+                    <a:p>
+                      <a:r>
+                        <a:rPr lang="nb-NO" sz="1100" dirty="0">
+                          <a:latin typeface="Leelawadee" panose="020B0502040204020203" pitchFamily="34" charset="-34"/>
+                          <a:cs typeface="Leelawadee" panose="020B0502040204020203" pitchFamily="34" charset="-34"/>
+                        </a:rPr>
+                        <a:t>9 // 4 = 2</a:t>
                       </a:r>
                     </a:p>
                   </a:txBody>
@@ -4692,7 +4686,7 @@
                 </a:tc>
                 <a:extLst>
                   <a:ext uri="{0D108BD9-81ED-4DB2-BD59-A6C34878D82A}">
-                    <a16:rowId xmlns:a16="http://schemas.microsoft.com/office/drawing/2014/main" val="2344923324"/>
+                    <a16:rowId xmlns:a16="http://schemas.microsoft.com/office/drawing/2014/main" val="2303237608"/>
                   </a:ext>
                 </a:extLst>
               </a:tr>
@@ -4732,7 +4726,7 @@
                           <a:latin typeface="Leelawadee" panose="020B0502040204020203" pitchFamily="34" charset="-34"/>
                           <a:cs typeface="Leelawadee" panose="020B0502040204020203" pitchFamily="34" charset="-34"/>
                         </a:rPr>
-                        <a:t>Eksempel</a:t>
+                        <a:t>Eksempel:</a:t>
                       </a:r>
                     </a:p>
                     <a:p>
@@ -4749,7 +4743,7 @@
                 </a:tc>
                 <a:extLst>
                   <a:ext uri="{0D108BD9-81ED-4DB2-BD59-A6C34878D82A}">
-                    <a16:rowId xmlns:a16="http://schemas.microsoft.com/office/drawing/2014/main" val="4122252692"/>
+                    <a16:rowId xmlns:a16="http://schemas.microsoft.com/office/drawing/2014/main" val="2603583246"/>
                   </a:ext>
                 </a:extLst>
               </a:tr>
@@ -4764,49 +4758,55 @@
                           <a:latin typeface="Source Code Pro" panose="020B0509030403020204" pitchFamily="49" charset="0"/>
                           <a:ea typeface="Source Code Pro" panose="020B0509030403020204" pitchFamily="49" charset="0"/>
                         </a:rPr>
-                        <a:t>//</a:t>
-                      </a:r>
-                    </a:p>
-                  </a:txBody>
-                  <a:tcPr/>
-                </a:tc>
-                <a:tc>
-                  <a:txBody>
-                    <a:bodyPr/>
-                    <a:lstStyle/>
-                    <a:p>
-                      <a:r>
-                        <a:rPr lang="nb-NO" sz="1100" dirty="0">
-                          <a:latin typeface="Leelawadee" panose="020B0502040204020203" pitchFamily="34" charset="-34"/>
-                          <a:cs typeface="Leelawadee" panose="020B0502040204020203" pitchFamily="34" charset="-34"/>
-                        </a:rPr>
-                        <a:t>Heltalldivisjon</a:t>
-                      </a:r>
-                    </a:p>
-                    <a:p>
-                      <a:r>
-                        <a:rPr lang="nb-NO" sz="1100" dirty="0">
-                          <a:latin typeface="Leelawadee" panose="020B0502040204020203" pitchFamily="34" charset="-34"/>
-                          <a:cs typeface="Leelawadee" panose="020B0502040204020203" pitchFamily="34" charset="-34"/>
-                        </a:rPr>
-                        <a:t>Eksempel:</a:t>
-                      </a:r>
-                    </a:p>
-                    <a:p>
-                      <a:r>
-                        <a:rPr lang="nb-NO" sz="1100" dirty="0">
-                          <a:latin typeface="Leelawadee" panose="020B0502040204020203" pitchFamily="34" charset="-34"/>
-                          <a:cs typeface="Leelawadee" panose="020B0502040204020203" pitchFamily="34" charset="-34"/>
-                        </a:rPr>
-                        <a:t>9 // 4 = 2</a:t>
-                      </a:r>
+                        <a:t>**</a:t>
+                      </a:r>
+                    </a:p>
+                  </a:txBody>
+                  <a:tcPr/>
+                </a:tc>
+                <a:tc>
+                  <a:txBody>
+                    <a:bodyPr/>
+                    <a:lstStyle/>
+                    <a:p>
+                      <a:r>
+                        <a:rPr lang="nb-NO" sz="1100" dirty="0">
+                          <a:latin typeface="Leelawadee" panose="020B0502040204020203" pitchFamily="34" charset="-34"/>
+                          <a:cs typeface="Leelawadee" panose="020B0502040204020203" pitchFamily="34" charset="-34"/>
+                        </a:rPr>
+                        <a:t>Eksponent</a:t>
+                      </a:r>
+                    </a:p>
+                    <a:p>
+                      <a:r>
+                        <a:rPr lang="nb-NO" sz="1100" dirty="0">
+                          <a:latin typeface="Leelawadee" panose="020B0502040204020203" pitchFamily="34" charset="-34"/>
+                          <a:cs typeface="Leelawadee" panose="020B0502040204020203" pitchFamily="34" charset="-34"/>
+                        </a:rPr>
+                        <a:t>Eksempel</a:t>
+                      </a:r>
+                    </a:p>
+                    <a:p>
+                      <a:r>
+                        <a:rPr lang="nb-NO" sz="1100" dirty="0">
+                          <a:latin typeface="Leelawadee" panose="020B0502040204020203" pitchFamily="34" charset="-34"/>
+                          <a:cs typeface="Leelawadee" panose="020B0502040204020203" pitchFamily="34" charset="-34"/>
+                        </a:rPr>
+                        <a:t>9 ** 4 = 6561</a:t>
+                      </a:r>
+                    </a:p>
+                    <a:p>
+                      <a:endParaRPr lang="nb-NO" sz="1100" dirty="0">
+                        <a:latin typeface="Leelawadee" panose="020B0502040204020203" pitchFamily="34" charset="-34"/>
+                        <a:cs typeface="Leelawadee" panose="020B0502040204020203" pitchFamily="34" charset="-34"/>
+                      </a:endParaRPr>
                     </a:p>
                   </a:txBody>
                   <a:tcPr/>
                 </a:tc>
                 <a:extLst>
                   <a:ext uri="{0D108BD9-81ED-4DB2-BD59-A6C34878D82A}">
-                    <a16:rowId xmlns:a16="http://schemas.microsoft.com/office/drawing/2014/main" val="2303237608"/>
+                    <a16:rowId xmlns:a16="http://schemas.microsoft.com/office/drawing/2014/main" val="3753933534"/>
                   </a:ext>
                 </a:extLst>
               </a:tr>
@@ -5337,7 +5337,7 @@
           <p:nvPr>
             <p:extLst>
               <p:ext uri="{D42A27DB-BD31-4B8C-83A1-F6EECF244321}">
-                <p14:modId xmlns:p14="http://schemas.microsoft.com/office/powerpoint/2010/main" val="628618800"/>
+                <p14:modId xmlns:p14="http://schemas.microsoft.com/office/powerpoint/2010/main" val="2322964066"/>
               </p:ext>
             </p:extLst>
           </p:nvPr>
@@ -5672,7 +5672,7 @@
                           <a:latin typeface="Leelawadee" panose="020B0502040204020203" pitchFamily="34" charset="-34"/>
                           <a:cs typeface="Leelawadee" panose="020B0502040204020203" pitchFamily="34" charset="-34"/>
                         </a:rPr>
-                        <a:t>Runder av opp</a:t>
+                        <a:t>Runder av opp til heltall</a:t>
                       </a:r>
                     </a:p>
                   </a:txBody>
@@ -5718,7 +5718,7 @@
                           <a:latin typeface="Leelawadee" panose="020B0502040204020203" pitchFamily="34" charset="-34"/>
                           <a:cs typeface="Leelawadee" panose="020B0502040204020203" pitchFamily="34" charset="-34"/>
                         </a:rPr>
-                        <a:t>Runder av ned</a:t>
+                        <a:t>Runder av ned til heltall</a:t>
                       </a:r>
                     </a:p>
                   </a:txBody>

</xml_diff>

<commit_message>
Felretting og tillegg i flyttall-listeeksempel
</commit_message>
<xml_diff>
--- a/Støttemateriell/python jukselapp for matte.pptx
+++ b/Støttemateriell/python jukselapp for matte.pptx
@@ -3771,7 +3771,7 @@
           <p:nvPr>
             <p:extLst>
               <p:ext uri="{D42A27DB-BD31-4B8C-83A1-F6EECF244321}">
-                <p14:modId xmlns:p14="http://schemas.microsoft.com/office/powerpoint/2010/main" val="1999381317"/>
+                <p14:modId xmlns:p14="http://schemas.microsoft.com/office/powerpoint/2010/main" val="2809098360"/>
               </p:ext>
             </p:extLst>
           </p:nvPr>
@@ -4105,7 +4105,7 @@
                           <a:latin typeface="Source Code Pro" panose="020B0509030403020204" pitchFamily="49" charset="0"/>
                           <a:ea typeface="Source Code Pro" panose="020B0509030403020204" pitchFamily="49" charset="0"/>
                         </a:rPr>
-                        <a:t>l = [2.3, 2.5, 3.3, 1.9, 1,4]</a:t>
+                        <a:t>l = [2.3, 2.5, 3.3, 1.9, 1.4]</a:t>
                       </a:r>
                     </a:p>
                   </a:txBody>
@@ -4288,8 +4288,19 @@
                           <a:latin typeface="Source Code Pro" panose="020B0509030403020204" pitchFamily="49" charset="0"/>
                           <a:ea typeface="Source Code Pro" panose="020B0509030403020204" pitchFamily="49" charset="0"/>
                         </a:rPr>
-                        <a:t>l[2] gir 2.5</a:t>
-                      </a:r>
+                        <a:t>l[-1] </a:t>
+                      </a:r>
+                      <a:r>
+                        <a:rPr lang="nb-NO" sz="1000">
+                          <a:latin typeface="Source Code Pro" panose="020B0509030403020204" pitchFamily="49" charset="0"/>
+                          <a:ea typeface="Source Code Pro" panose="020B0509030403020204" pitchFamily="49" charset="0"/>
+                        </a:rPr>
+                        <a:t>gir 1.4</a:t>
+                      </a:r>
+                      <a:endParaRPr lang="nb-NO" sz="1000" dirty="0">
+                        <a:latin typeface="Source Code Pro" panose="020B0509030403020204" pitchFamily="49" charset="0"/>
+                        <a:ea typeface="Source Code Pro" panose="020B0509030403020204" pitchFamily="49" charset="0"/>
+                      </a:endParaRPr>
                     </a:p>
                   </a:txBody>
                   <a:tcPr/>

</xml_diff>

<commit_message>
Legger til len(), fjerner np.zeros()
</commit_message>
<xml_diff>
--- a/Støttemateriell/python jukselapp for matte.pptx
+++ b/Støttemateriell/python jukselapp for matte.pptx
@@ -3618,7 +3618,7 @@
         </p:blipFill>
         <p:spPr bwMode="auto">
           <a:xfrm>
-            <a:off x="2001014" y="-106062"/>
+            <a:off x="2001014" y="26142"/>
             <a:ext cx="2679700" cy="901700"/>
           </a:xfrm>
           <a:prstGeom prst="rect">
@@ -3650,7 +3650,7 @@
         </p:nvSpPr>
         <p:spPr>
           <a:xfrm>
-            <a:off x="2244224" y="0"/>
+            <a:off x="2244224" y="132204"/>
             <a:ext cx="2369559" cy="1400383"/>
           </a:xfrm>
           <a:prstGeom prst="rect">
@@ -4352,13 +4352,13 @@
           <p:nvPr>
             <p:extLst>
               <p:ext uri="{D42A27DB-BD31-4B8C-83A1-F6EECF244321}">
-                <p14:modId xmlns:p14="http://schemas.microsoft.com/office/powerpoint/2010/main" val="3756421715"/>
+                <p14:modId xmlns:p14="http://schemas.microsoft.com/office/powerpoint/2010/main" val="27667824"/>
               </p:ext>
             </p:extLst>
           </p:nvPr>
         </p:nvGraphicFramePr>
         <p:xfrm>
-          <a:off x="2302526" y="1326150"/>
+          <a:off x="2302526" y="1689710"/>
           <a:ext cx="2258458" cy="4699000"/>
         </p:xfrm>
         <a:graphic>
@@ -4840,14 +4840,14 @@
           <p:nvPr>
             <p:extLst>
               <p:ext uri="{D42A27DB-BD31-4B8C-83A1-F6EECF244321}">
-                <p14:modId xmlns:p14="http://schemas.microsoft.com/office/powerpoint/2010/main" val="1030115347"/>
+                <p14:modId xmlns:p14="http://schemas.microsoft.com/office/powerpoint/2010/main" val="2484329756"/>
               </p:ext>
             </p:extLst>
           </p:nvPr>
         </p:nvGraphicFramePr>
         <p:xfrm>
           <a:off x="4599542" y="22034"/>
-          <a:ext cx="2258458" cy="4272280"/>
+          <a:ext cx="2258458" cy="4699000"/>
         </p:xfrm>
         <a:graphic>
           <a:graphicData uri="http://schemas.openxmlformats.org/drawingml/2006/table">
@@ -5329,6 +5329,45 @@
                   </a:ext>
                 </a:extLst>
               </a:tr>
+              <a:tr h="370840">
+                <a:tc>
+                  <a:txBody>
+                    <a:bodyPr/>
+                    <a:lstStyle/>
+                    <a:p>
+                      <a:r>
+                        <a:rPr lang="nb-NO" sz="1000" dirty="0">
+                          <a:latin typeface="Source Code Pro" panose="020B0509030403020204" pitchFamily="49" charset="0"/>
+                          <a:ea typeface="Source Code Pro" panose="020B0509030403020204" pitchFamily="49" charset="0"/>
+                        </a:rPr>
+                        <a:t>len()</a:t>
+                      </a:r>
+                    </a:p>
+                  </a:txBody>
+                  <a:tcPr/>
+                </a:tc>
+                <a:tc>
+                  <a:txBody>
+                    <a:bodyPr/>
+                    <a:lstStyle/>
+                    <a:p>
+                      <a:r>
+                        <a:rPr lang="nb-NO" sz="1100" dirty="0">
+                          <a:latin typeface="Leelawadee" panose="020B0502040204020203" pitchFamily="34" charset="-34"/>
+                          <a:cs typeface="Leelawadee" panose="020B0502040204020203" pitchFamily="34" charset="-34"/>
+                        </a:rPr>
+                        <a:t>Antall elementer i en liste.</a:t>
+                      </a:r>
+                    </a:p>
+                  </a:txBody>
+                  <a:tcPr/>
+                </a:tc>
+                <a:extLst>
+                  <a:ext uri="{0D108BD9-81ED-4DB2-BD59-A6C34878D82A}">
+                    <a16:rowId xmlns:a16="http://schemas.microsoft.com/office/drawing/2014/main" val="933770492"/>
+                  </a:ext>
+                </a:extLst>
+              </a:tr>
             </a:tbl>
           </a:graphicData>
         </a:graphic>
@@ -5348,13 +5387,13 @@
           <p:nvPr>
             <p:extLst>
               <p:ext uri="{D42A27DB-BD31-4B8C-83A1-F6EECF244321}">
-                <p14:modId xmlns:p14="http://schemas.microsoft.com/office/powerpoint/2010/main" val="2322964066"/>
+                <p14:modId xmlns:p14="http://schemas.microsoft.com/office/powerpoint/2010/main" val="3917272338"/>
               </p:ext>
             </p:extLst>
           </p:nvPr>
         </p:nvGraphicFramePr>
         <p:xfrm>
-          <a:off x="-14234" y="4072508"/>
+          <a:off x="-3217" y="4072508"/>
           <a:ext cx="2258458" cy="5064760"/>
         </p:xfrm>
         <a:graphic>
@@ -5951,13 +5990,13 @@
           <p:nvPr>
             <p:extLst>
               <p:ext uri="{D42A27DB-BD31-4B8C-83A1-F6EECF244321}">
-                <p14:modId xmlns:p14="http://schemas.microsoft.com/office/powerpoint/2010/main" val="1812610888"/>
+                <p14:modId xmlns:p14="http://schemas.microsoft.com/office/powerpoint/2010/main" val="1821757108"/>
               </p:ext>
             </p:extLst>
           </p:nvPr>
         </p:nvGraphicFramePr>
         <p:xfrm>
-          <a:off x="4599542" y="4294314"/>
+          <a:off x="4599542" y="4690923"/>
           <a:ext cx="2258458" cy="1727200"/>
         </p:xfrm>
         <a:graphic>
@@ -6210,14 +6249,14 @@
           <p:nvPr>
             <p:extLst>
               <p:ext uri="{D42A27DB-BD31-4B8C-83A1-F6EECF244321}">
-                <p14:modId xmlns:p14="http://schemas.microsoft.com/office/powerpoint/2010/main" val="1742610983"/>
+                <p14:modId xmlns:p14="http://schemas.microsoft.com/office/powerpoint/2010/main" val="2132258525"/>
               </p:ext>
             </p:extLst>
           </p:nvPr>
         </p:nvGraphicFramePr>
         <p:xfrm>
-          <a:off x="2299771" y="6018448"/>
-          <a:ext cx="4558229" cy="3119120"/>
+          <a:off x="2292886" y="6429566"/>
+          <a:ext cx="4558229" cy="2692400"/>
         </p:xfrm>
         <a:graphic>
           <a:graphicData uri="http://schemas.openxmlformats.org/drawingml/2006/table">
@@ -6421,68 +6460,6 @@
                 <a:extLst>
                   <a:ext uri="{0D108BD9-81ED-4DB2-BD59-A6C34878D82A}">
                     <a16:rowId xmlns:a16="http://schemas.microsoft.com/office/drawing/2014/main" val="3585812055"/>
-                  </a:ext>
-                </a:extLst>
-              </a:tr>
-              <a:tr h="370840">
-                <a:tc>
-                  <a:txBody>
-                    <a:bodyPr/>
-                    <a:lstStyle/>
-                    <a:p>
-                      <a:r>
-                        <a:rPr lang="nb-NO" sz="1000" dirty="0" err="1">
-                          <a:latin typeface="Source Code Pro" panose="020B0509030403020204" pitchFamily="49" charset="0"/>
-                          <a:ea typeface="Source Code Pro" panose="020B0509030403020204" pitchFamily="49" charset="0"/>
-                        </a:rPr>
-                        <a:t>np.zeros</a:t>
-                      </a:r>
-                      <a:r>
-                        <a:rPr lang="nb-NO" sz="1000" dirty="0">
-                          <a:latin typeface="Source Code Pro" panose="020B0509030403020204" pitchFamily="49" charset="0"/>
-                          <a:ea typeface="Source Code Pro" panose="020B0509030403020204" pitchFamily="49" charset="0"/>
-                        </a:rPr>
-                        <a:t>(n)</a:t>
-                      </a:r>
-                    </a:p>
-                  </a:txBody>
-                  <a:tcPr/>
-                </a:tc>
-                <a:tc>
-                  <a:txBody>
-                    <a:bodyPr/>
-                    <a:lstStyle/>
-                    <a:p>
-                      <a:r>
-                        <a:rPr lang="nb-NO" sz="1100" dirty="0">
-                          <a:latin typeface="Leelawadee" panose="020B0502040204020203" pitchFamily="34" charset="-34"/>
-                          <a:cs typeface="Leelawadee" panose="020B0502040204020203" pitchFamily="34" charset="-34"/>
-                        </a:rPr>
-                        <a:t>Gir en liste med n nuller. Eksempel:</a:t>
-                      </a:r>
-                    </a:p>
-                    <a:p>
-                      <a:r>
-                        <a:rPr lang="nb-NO" sz="1100" dirty="0" err="1">
-                          <a:latin typeface="Leelawadee" panose="020B0502040204020203" pitchFamily="34" charset="-34"/>
-                          <a:cs typeface="Leelawadee" panose="020B0502040204020203" pitchFamily="34" charset="-34"/>
-                        </a:rPr>
-                        <a:t>np.zeros</a:t>
-                      </a:r>
-                      <a:r>
-                        <a:rPr lang="nb-NO" sz="1100" dirty="0">
-                          <a:latin typeface="Leelawadee" panose="020B0502040204020203" pitchFamily="34" charset="-34"/>
-                          <a:cs typeface="Leelawadee" panose="020B0502040204020203" pitchFamily="34" charset="-34"/>
-                        </a:rPr>
-                        <a:t>(4) gir [0, 0, 0, 0]</a:t>
-                      </a:r>
-                    </a:p>
-                  </a:txBody>
-                  <a:tcPr/>
-                </a:tc>
-                <a:extLst>
-                  <a:ext uri="{0D108BD9-81ED-4DB2-BD59-A6C34878D82A}">
-                    <a16:rowId xmlns:a16="http://schemas.microsoft.com/office/drawing/2014/main" val="2946439083"/>
                   </a:ext>
                 </a:extLst>
               </a:tr>

</xml_diff>